<commit_message>
updated ppt based on feedback joshi
</commit_message>
<xml_diff>
--- a/GIT/Git basics.pptx
+++ b/GIT/Git basics.pptx
@@ -2,24 +2,26 @@
 <file path=ppt/presentation.xml><?xml version="1.0" encoding="utf-8"?>
 <p:presentation xmlns:a="http://schemas.openxmlformats.org/drawingml/2006/main" xmlns:r="http://schemas.openxmlformats.org/officeDocument/2006/relationships" xmlns:p="http://schemas.openxmlformats.org/presentationml/2006/main" saveSubsetFonts="1">
   <p:sldMasterIdLst>
-    <p:sldMasterId id="2147483648" r:id="rId1"/>
+    <p:sldMasterId id="2147483648" r:id="rId4"/>
   </p:sldMasterIdLst>
   <p:sldIdLst>
-    <p:sldId id="256" r:id="rId2"/>
-    <p:sldId id="263" r:id="rId3"/>
-    <p:sldId id="265" r:id="rId4"/>
-    <p:sldId id="264" r:id="rId5"/>
-    <p:sldId id="266" r:id="rId6"/>
-    <p:sldId id="267" r:id="rId7"/>
-    <p:sldId id="261" r:id="rId8"/>
-    <p:sldId id="259" r:id="rId9"/>
-    <p:sldId id="260" r:id="rId10"/>
-    <p:sldId id="262" r:id="rId11"/>
-    <p:sldId id="268" r:id="rId12"/>
-    <p:sldId id="269" r:id="rId13"/>
-    <p:sldId id="270" r:id="rId14"/>
-    <p:sldId id="271" r:id="rId15"/>
-    <p:sldId id="272" r:id="rId16"/>
+    <p:sldId id="256" r:id="rId5"/>
+    <p:sldId id="263" r:id="rId6"/>
+    <p:sldId id="265" r:id="rId7"/>
+    <p:sldId id="264" r:id="rId8"/>
+    <p:sldId id="266" r:id="rId9"/>
+    <p:sldId id="267" r:id="rId10"/>
+    <p:sldId id="261" r:id="rId11"/>
+    <p:sldId id="259" r:id="rId12"/>
+    <p:sldId id="260" r:id="rId13"/>
+    <p:sldId id="262" r:id="rId14"/>
+    <p:sldId id="268" r:id="rId15"/>
+    <p:sldId id="274" r:id="rId16"/>
+    <p:sldId id="275" r:id="rId17"/>
+    <p:sldId id="269" r:id="rId18"/>
+    <p:sldId id="270" r:id="rId19"/>
+    <p:sldId id="271" r:id="rId20"/>
+    <p:sldId id="272" r:id="rId21"/>
   </p:sldIdLst>
   <p:sldSz cx="12192000" cy="6858000"/>
   <p:notesSz cx="6858000" cy="9144000"/>
@@ -154,6 +156,8 @@
         </p14:section>
         <p14:section name="GIT workflow" id="{BFF2917E-DB30-4808-9378-035494E9B428}">
           <p14:sldIdLst>
+            <p14:sldId id="274"/>
+            <p14:sldId id="275"/>
             <p14:sldId id="269"/>
             <p14:sldId id="270"/>
             <p14:sldId id="271"/>
@@ -304,7 +308,7 @@
           <a:p>
             <a:fld id="{2EC45671-2192-4EF4-B663-6CE8EF612D45}" type="datetimeFigureOut">
               <a:rPr lang="nl-NL" smtClean="0"/>
-              <a:t>24-6-2021</a:t>
+              <a:t>20-12-2022</a:t>
             </a:fld>
             <a:endParaRPr lang="nl-NL"/>
           </a:p>
@@ -474,7 +478,7 @@
           <a:p>
             <a:fld id="{2EC45671-2192-4EF4-B663-6CE8EF612D45}" type="datetimeFigureOut">
               <a:rPr lang="nl-NL" smtClean="0"/>
-              <a:t>24-6-2021</a:t>
+              <a:t>20-12-2022</a:t>
             </a:fld>
             <a:endParaRPr lang="nl-NL"/>
           </a:p>
@@ -654,7 +658,7 @@
           <a:p>
             <a:fld id="{2EC45671-2192-4EF4-B663-6CE8EF612D45}" type="datetimeFigureOut">
               <a:rPr lang="nl-NL" smtClean="0"/>
-              <a:t>24-6-2021</a:t>
+              <a:t>20-12-2022</a:t>
             </a:fld>
             <a:endParaRPr lang="nl-NL"/>
           </a:p>
@@ -824,7 +828,7 @@
           <a:p>
             <a:fld id="{2EC45671-2192-4EF4-B663-6CE8EF612D45}" type="datetimeFigureOut">
               <a:rPr lang="nl-NL" smtClean="0"/>
-              <a:t>24-6-2021</a:t>
+              <a:t>20-12-2022</a:t>
             </a:fld>
             <a:endParaRPr lang="nl-NL"/>
           </a:p>
@@ -1070,7 +1074,7 @@
           <a:p>
             <a:fld id="{2EC45671-2192-4EF4-B663-6CE8EF612D45}" type="datetimeFigureOut">
               <a:rPr lang="nl-NL" smtClean="0"/>
-              <a:t>24-6-2021</a:t>
+              <a:t>20-12-2022</a:t>
             </a:fld>
             <a:endParaRPr lang="nl-NL"/>
           </a:p>
@@ -1302,7 +1306,7 @@
           <a:p>
             <a:fld id="{2EC45671-2192-4EF4-B663-6CE8EF612D45}" type="datetimeFigureOut">
               <a:rPr lang="nl-NL" smtClean="0"/>
-              <a:t>24-6-2021</a:t>
+              <a:t>20-12-2022</a:t>
             </a:fld>
             <a:endParaRPr lang="nl-NL"/>
           </a:p>
@@ -1669,7 +1673,7 @@
           <a:p>
             <a:fld id="{2EC45671-2192-4EF4-B663-6CE8EF612D45}" type="datetimeFigureOut">
               <a:rPr lang="nl-NL" smtClean="0"/>
-              <a:t>24-6-2021</a:t>
+              <a:t>20-12-2022</a:t>
             </a:fld>
             <a:endParaRPr lang="nl-NL"/>
           </a:p>
@@ -1787,7 +1791,7 @@
           <a:p>
             <a:fld id="{2EC45671-2192-4EF4-B663-6CE8EF612D45}" type="datetimeFigureOut">
               <a:rPr lang="nl-NL" smtClean="0"/>
-              <a:t>24-6-2021</a:t>
+              <a:t>20-12-2022</a:t>
             </a:fld>
             <a:endParaRPr lang="nl-NL"/>
           </a:p>
@@ -1882,7 +1886,7 @@
           <a:p>
             <a:fld id="{2EC45671-2192-4EF4-B663-6CE8EF612D45}" type="datetimeFigureOut">
               <a:rPr lang="nl-NL" smtClean="0"/>
-              <a:t>24-6-2021</a:t>
+              <a:t>20-12-2022</a:t>
             </a:fld>
             <a:endParaRPr lang="nl-NL"/>
           </a:p>
@@ -2159,7 +2163,7 @@
           <a:p>
             <a:fld id="{2EC45671-2192-4EF4-B663-6CE8EF612D45}" type="datetimeFigureOut">
               <a:rPr lang="nl-NL" smtClean="0"/>
-              <a:t>24-6-2021</a:t>
+              <a:t>20-12-2022</a:t>
             </a:fld>
             <a:endParaRPr lang="nl-NL"/>
           </a:p>
@@ -2412,7 +2416,7 @@
           <a:p>
             <a:fld id="{2EC45671-2192-4EF4-B663-6CE8EF612D45}" type="datetimeFigureOut">
               <a:rPr lang="nl-NL" smtClean="0"/>
-              <a:t>24-6-2021</a:t>
+              <a:t>20-12-2022</a:t>
             </a:fld>
             <a:endParaRPr lang="nl-NL"/>
           </a:p>
@@ -2625,7 +2629,7 @@
           <a:p>
             <a:fld id="{2EC45671-2192-4EF4-B663-6CE8EF612D45}" type="datetimeFigureOut">
               <a:rPr lang="nl-NL" smtClean="0"/>
-              <a:t>24-6-2021</a:t>
+              <a:t>20-12-2022</a:t>
             </a:fld>
             <a:endParaRPr lang="nl-NL"/>
           </a:p>
@@ -3191,13 +3195,8 @@
             <a:pPr lvl="1"/>
             <a:r>
               <a:rPr lang="en-US" sz="2000" dirty="0" smtClean="0"/>
-              <a:t>Useful for </a:t>
-            </a:r>
-            <a:r>
-              <a:rPr lang="en-US" sz="2000" dirty="0" smtClean="0"/>
-              <a:t>pipeline automation</a:t>
-            </a:r>
-            <a:endParaRPr lang="en-US" sz="2000" dirty="0" smtClean="0"/>
+              <a:t>Useful for pipeline automation</a:t>
+            </a:r>
           </a:p>
           <a:p>
             <a:r>
@@ -3560,8 +3559,24 @@
           <a:lstStyle/>
           <a:p>
             <a:r>
-              <a:rPr lang="en-US" dirty="0" smtClean="0"/>
-              <a:t>Primary a case of personal preference</a:t>
+              <a:rPr lang="nl-NL" dirty="0" err="1"/>
+              <a:t>P</a:t>
+            </a:r>
+            <a:r>
+              <a:rPr lang="nl-NL" dirty="0" err="1" smtClean="0"/>
+              <a:t>rimarily</a:t>
+            </a:r>
+            <a:r>
+              <a:rPr lang="nl-NL" dirty="0"/>
+              <a:t> </a:t>
+            </a:r>
+            <a:r>
+              <a:rPr lang="en-US" dirty="0" smtClean="0"/>
+              <a:t> </a:t>
+            </a:r>
+            <a:r>
+              <a:rPr lang="en-US" dirty="0" smtClean="0"/>
+              <a:t>a case of personal preference</a:t>
             </a:r>
           </a:p>
           <a:p>
@@ -3632,6 +3647,403 @@
           <a:p>
             <a:r>
               <a:rPr lang="en-US" dirty="0" smtClean="0"/>
+              <a:t>Workflow terminology:</a:t>
+            </a:r>
+            <a:endParaRPr lang="nl-NL" dirty="0"/>
+          </a:p>
+        </p:txBody>
+      </p:sp>
+      <p:sp>
+        <p:nvSpPr>
+          <p:cNvPr id="3" name="Content Placeholder 2"/>
+          <p:cNvSpPr>
+            <a:spLocks noGrp="1"/>
+          </p:cNvSpPr>
+          <p:nvPr>
+            <p:ph idx="1"/>
+          </p:nvPr>
+        </p:nvSpPr>
+        <p:spPr/>
+        <p:txBody>
+          <a:bodyPr/>
+          <a:lstStyle/>
+          <a:p>
+            <a:r>
+              <a:rPr lang="en-US" dirty="0" smtClean="0"/>
+              <a:t>Master/Main: </a:t>
+            </a:r>
+            <a:r>
+              <a:rPr lang="en-US" dirty="0"/>
+              <a:t>the </a:t>
+            </a:r>
+            <a:r>
+              <a:rPr lang="en-US" dirty="0" smtClean="0"/>
+              <a:t>main version of the repository</a:t>
+            </a:r>
+            <a:endParaRPr lang="en-US" dirty="0"/>
+          </a:p>
+          <a:p>
+            <a:r>
+              <a:rPr lang="en-US" dirty="0" smtClean="0"/>
+              <a:t>Branch:</a:t>
+            </a:r>
+            <a:r>
+              <a:rPr lang="nl-NL" dirty="0"/>
+              <a:t> </a:t>
+            </a:r>
+            <a:r>
+              <a:rPr lang="nl-NL" dirty="0" smtClean="0"/>
+              <a:t>a </a:t>
+            </a:r>
+            <a:r>
+              <a:rPr lang="nl-NL" dirty="0" err="1" smtClean="0"/>
+              <a:t>version</a:t>
+            </a:r>
+            <a:r>
+              <a:rPr lang="nl-NL" dirty="0" smtClean="0"/>
+              <a:t> of </a:t>
+            </a:r>
+            <a:r>
+              <a:rPr lang="nl-NL" dirty="0" err="1" smtClean="0"/>
+              <a:t>the</a:t>
+            </a:r>
+            <a:r>
+              <a:rPr lang="nl-NL" dirty="0" smtClean="0"/>
+              <a:t> </a:t>
+            </a:r>
+            <a:r>
+              <a:rPr lang="nl-NL" dirty="0" err="1" smtClean="0"/>
+              <a:t>repository</a:t>
+            </a:r>
+            <a:r>
+              <a:rPr lang="nl-NL" dirty="0" smtClean="0"/>
+              <a:t> </a:t>
+            </a:r>
+            <a:r>
+              <a:rPr lang="nl-NL" dirty="0" err="1" smtClean="0"/>
+              <a:t>that</a:t>
+            </a:r>
+            <a:r>
+              <a:rPr lang="nl-NL" dirty="0" smtClean="0"/>
+              <a:t> </a:t>
+            </a:r>
+            <a:r>
+              <a:rPr lang="nl-NL" dirty="0" err="1" smtClean="0"/>
+              <a:t>diverges</a:t>
+            </a:r>
+            <a:r>
+              <a:rPr lang="nl-NL" dirty="0" smtClean="0"/>
+              <a:t> </a:t>
+            </a:r>
+            <a:r>
+              <a:rPr lang="nl-NL" dirty="0" err="1" smtClean="0"/>
+              <a:t>from</a:t>
+            </a:r>
+            <a:r>
+              <a:rPr lang="nl-NL" dirty="0" smtClean="0"/>
+              <a:t> </a:t>
+            </a:r>
+            <a:r>
+              <a:rPr lang="nl-NL" dirty="0" err="1" smtClean="0"/>
+              <a:t>the</a:t>
+            </a:r>
+            <a:r>
+              <a:rPr lang="nl-NL" dirty="0" smtClean="0"/>
+              <a:t> </a:t>
+            </a:r>
+            <a:r>
+              <a:rPr lang="nl-NL" dirty="0" err="1" smtClean="0"/>
+              <a:t>main</a:t>
+            </a:r>
+            <a:r>
+              <a:rPr lang="nl-NL" dirty="0" smtClean="0"/>
+              <a:t> </a:t>
+            </a:r>
+            <a:r>
+              <a:rPr lang="nl-NL" dirty="0" err="1" smtClean="0"/>
+              <a:t>version</a:t>
+            </a:r>
+            <a:r>
+              <a:rPr lang="nl-NL" dirty="0" smtClean="0"/>
+              <a:t>. </a:t>
+            </a:r>
+            <a:r>
+              <a:rPr lang="nl-NL" dirty="0" err="1" smtClean="0"/>
+              <a:t>This</a:t>
+            </a:r>
+            <a:r>
+              <a:rPr lang="nl-NL" dirty="0" smtClean="0"/>
+              <a:t> </a:t>
+            </a:r>
+            <a:r>
+              <a:rPr lang="nl-NL" dirty="0" err="1" smtClean="0"/>
+              <a:t>can</a:t>
+            </a:r>
+            <a:r>
+              <a:rPr lang="nl-NL" dirty="0" smtClean="0"/>
+              <a:t> </a:t>
+            </a:r>
+            <a:r>
+              <a:rPr lang="nl-NL" dirty="0" err="1" smtClean="0"/>
+              <a:t>be</a:t>
+            </a:r>
+            <a:r>
+              <a:rPr lang="nl-NL" dirty="0" smtClean="0"/>
+              <a:t> </a:t>
+            </a:r>
+            <a:r>
+              <a:rPr lang="nl-NL" dirty="0" err="1" smtClean="0"/>
+              <a:t>temporary</a:t>
+            </a:r>
+            <a:r>
+              <a:rPr lang="nl-NL" dirty="0" smtClean="0"/>
+              <a:t>, </a:t>
+            </a:r>
+            <a:r>
+              <a:rPr lang="nl-NL" dirty="0" err="1" smtClean="0"/>
+              <a:t>for</a:t>
+            </a:r>
+            <a:r>
+              <a:rPr lang="nl-NL" dirty="0" smtClean="0"/>
+              <a:t> </a:t>
+            </a:r>
+            <a:r>
+              <a:rPr lang="nl-NL" dirty="0" err="1" smtClean="0"/>
+              <a:t>example</a:t>
+            </a:r>
+            <a:r>
+              <a:rPr lang="nl-NL" dirty="0" smtClean="0"/>
+              <a:t> a </a:t>
+            </a:r>
+            <a:r>
+              <a:rPr lang="nl-NL" dirty="0" err="1" smtClean="0"/>
+              <a:t>branch</a:t>
+            </a:r>
+            <a:r>
+              <a:rPr lang="nl-NL" dirty="0"/>
+              <a:t> </a:t>
+            </a:r>
+            <a:r>
+              <a:rPr lang="nl-NL" dirty="0" smtClean="0"/>
+              <a:t>made </a:t>
+            </a:r>
+            <a:r>
+              <a:rPr lang="nl-NL" dirty="0" err="1" smtClean="0"/>
+              <a:t>for</a:t>
+            </a:r>
+            <a:r>
+              <a:rPr lang="nl-NL" dirty="0" smtClean="0"/>
+              <a:t> </a:t>
+            </a:r>
+            <a:r>
+              <a:rPr lang="nl-NL" dirty="0" err="1" smtClean="0"/>
+              <a:t>the</a:t>
+            </a:r>
+            <a:r>
+              <a:rPr lang="nl-NL" dirty="0" smtClean="0"/>
+              <a:t> safe </a:t>
+            </a:r>
+            <a:r>
+              <a:rPr lang="nl-NL" dirty="0" err="1" smtClean="0"/>
+              <a:t>implementation</a:t>
+            </a:r>
+            <a:r>
+              <a:rPr lang="nl-NL" dirty="0" smtClean="0"/>
+              <a:t> of a </a:t>
+            </a:r>
+            <a:r>
+              <a:rPr lang="nl-NL" dirty="0" err="1" smtClean="0"/>
+              <a:t>specific</a:t>
+            </a:r>
+            <a:r>
+              <a:rPr lang="nl-NL" dirty="0" smtClean="0"/>
+              <a:t> feature, or permanent; </a:t>
+            </a:r>
+            <a:r>
+              <a:rPr lang="nl-NL" dirty="0" err="1" smtClean="0"/>
+              <a:t>for</a:t>
+            </a:r>
+            <a:r>
+              <a:rPr lang="nl-NL" dirty="0" smtClean="0"/>
+              <a:t> </a:t>
+            </a:r>
+            <a:r>
+              <a:rPr lang="nl-NL" dirty="0" err="1" smtClean="0"/>
+              <a:t>example</a:t>
+            </a:r>
+            <a:r>
+              <a:rPr lang="nl-NL" dirty="0" smtClean="0"/>
+              <a:t> a release </a:t>
+            </a:r>
+            <a:r>
+              <a:rPr lang="nl-NL" dirty="0" err="1" smtClean="0"/>
+              <a:t>branch</a:t>
+            </a:r>
+            <a:r>
+              <a:rPr lang="nl-NL" dirty="0" smtClean="0"/>
+              <a:t>.</a:t>
+            </a:r>
+          </a:p>
+          <a:p>
+            <a:endParaRPr lang="nl-NL" dirty="0" smtClean="0"/>
+          </a:p>
+        </p:txBody>
+      </p:sp>
+    </p:spTree>
+    <p:extLst>
+      <p:ext uri="{BB962C8B-B14F-4D97-AF65-F5344CB8AC3E}">
+        <p14:creationId xmlns:p14="http://schemas.microsoft.com/office/powerpoint/2010/main" val="1117084422"/>
+      </p:ext>
+    </p:extLst>
+  </p:cSld>
+  <p:clrMapOvr>
+    <a:masterClrMapping/>
+  </p:clrMapOvr>
+</p:sld>
+</file>
+
+<file path=ppt/slides/slide13.xml><?xml version="1.0" encoding="utf-8"?>
+<p:sld xmlns:a="http://schemas.openxmlformats.org/drawingml/2006/main" xmlns:r="http://schemas.openxmlformats.org/officeDocument/2006/relationships" xmlns:p="http://schemas.openxmlformats.org/presentationml/2006/main">
+  <p:cSld>
+    <p:spTree>
+      <p:nvGrpSpPr>
+        <p:cNvPr id="1" name=""/>
+        <p:cNvGrpSpPr/>
+        <p:nvPr/>
+      </p:nvGrpSpPr>
+      <p:grpSpPr>
+        <a:xfrm>
+          <a:off x="0" y="0"/>
+          <a:ext cx="0" cy="0"/>
+          <a:chOff x="0" y="0"/>
+          <a:chExt cx="0" cy="0"/>
+        </a:xfrm>
+      </p:grpSpPr>
+      <p:sp>
+        <p:nvSpPr>
+          <p:cNvPr id="2" name="Title 1"/>
+          <p:cNvSpPr>
+            <a:spLocks noGrp="1"/>
+          </p:cNvSpPr>
+          <p:nvPr>
+            <p:ph type="title"/>
+          </p:nvPr>
+        </p:nvSpPr>
+        <p:spPr/>
+        <p:txBody>
+          <a:bodyPr/>
+          <a:lstStyle/>
+          <a:p>
+            <a:r>
+              <a:rPr lang="en-US" dirty="0" smtClean="0"/>
+              <a:t>GIT workflow</a:t>
+            </a:r>
+            <a:endParaRPr lang="nl-NL" dirty="0"/>
+          </a:p>
+        </p:txBody>
+      </p:sp>
+      <p:sp>
+        <p:nvSpPr>
+          <p:cNvPr id="3" name="Content Placeholder 2"/>
+          <p:cNvSpPr>
+            <a:spLocks noGrp="1"/>
+          </p:cNvSpPr>
+          <p:nvPr>
+            <p:ph idx="1"/>
+          </p:nvPr>
+        </p:nvSpPr>
+        <p:spPr/>
+        <p:txBody>
+          <a:bodyPr/>
+          <a:lstStyle/>
+          <a:p>
+            <a:r>
+              <a:rPr lang="en-US" dirty="0" smtClean="0"/>
+              <a:t>Branches are useful for managing project workflow.</a:t>
+            </a:r>
+          </a:p>
+          <a:p>
+            <a:pPr lvl="1"/>
+            <a:r>
+              <a:rPr lang="en-US" dirty="0" smtClean="0"/>
+              <a:t>If developer #1 working on branch #1 breaks his branch, then developer #2 can still work on his branch.</a:t>
+            </a:r>
+            <a:endParaRPr lang="en-US" dirty="0"/>
+          </a:p>
+          <a:p>
+            <a:pPr lvl="1"/>
+            <a:r>
+              <a:rPr lang="en-US" dirty="0"/>
+              <a:t>Especially useful when working on </a:t>
+            </a:r>
+            <a:r>
+              <a:rPr lang="en-US" dirty="0" smtClean="0"/>
+              <a:t>complex, big features, or when implementing features in parallel.</a:t>
+            </a:r>
+          </a:p>
+          <a:p>
+            <a:pPr lvl="1"/>
+            <a:r>
+              <a:rPr lang="en-US" dirty="0" smtClean="0"/>
+              <a:t>Possible to create stable branches for release versions</a:t>
+            </a:r>
+          </a:p>
+          <a:p>
+            <a:pPr lvl="1"/>
+            <a:r>
+              <a:rPr lang="en-US" dirty="0" smtClean="0"/>
+              <a:t>Two main strategies: Stable Master &amp; Unstable Master.</a:t>
+            </a:r>
+          </a:p>
+        </p:txBody>
+      </p:sp>
+    </p:spTree>
+    <p:extLst>
+      <p:ext uri="{BB962C8B-B14F-4D97-AF65-F5344CB8AC3E}">
+        <p14:creationId xmlns:p14="http://schemas.microsoft.com/office/powerpoint/2010/main" val="1080765484"/>
+      </p:ext>
+    </p:extLst>
+  </p:cSld>
+  <p:clrMapOvr>
+    <a:masterClrMapping/>
+  </p:clrMapOvr>
+</p:sld>
+</file>
+
+<file path=ppt/slides/slide14.xml><?xml version="1.0" encoding="utf-8"?>
+<p:sld xmlns:a="http://schemas.openxmlformats.org/drawingml/2006/main" xmlns:r="http://schemas.openxmlformats.org/officeDocument/2006/relationships" xmlns:p="http://schemas.openxmlformats.org/presentationml/2006/main">
+  <p:cSld>
+    <p:spTree>
+      <p:nvGrpSpPr>
+        <p:cNvPr id="1" name=""/>
+        <p:cNvGrpSpPr/>
+        <p:nvPr/>
+      </p:nvGrpSpPr>
+      <p:grpSpPr>
+        <a:xfrm>
+          <a:off x="0" y="0"/>
+          <a:ext cx="0" cy="0"/>
+          <a:chOff x="0" y="0"/>
+          <a:chExt cx="0" cy="0"/>
+        </a:xfrm>
+      </p:grpSpPr>
+      <p:sp>
+        <p:nvSpPr>
+          <p:cNvPr id="2" name="Title 1"/>
+          <p:cNvSpPr>
+            <a:spLocks noGrp="1"/>
+          </p:cNvSpPr>
+          <p:nvPr>
+            <p:ph type="title"/>
+          </p:nvPr>
+        </p:nvSpPr>
+        <p:spPr/>
+        <p:txBody>
+          <a:bodyPr/>
+          <a:lstStyle/>
+          <a:p>
+            <a:r>
+              <a:rPr lang="en-US" dirty="0" smtClean="0"/>
               <a:t>GIT workflow stable master:</a:t>
             </a:r>
             <a:endParaRPr lang="nl-NL" dirty="0"/>
@@ -3739,28 +4151,15 @@
             <a:pPr lvl="1"/>
             <a:r>
               <a:rPr lang="en-US" dirty="0" smtClean="0"/>
-              <a:t>Needs </a:t>
-            </a:r>
-            <a:r>
-              <a:rPr lang="en-US" dirty="0" smtClean="0"/>
-              <a:t>coordination </a:t>
-            </a:r>
-            <a:r>
-              <a:rPr lang="en-US" dirty="0" smtClean="0"/>
-              <a:t/>
+              <a:t>Needs coordination </a:t>
             </a:r>
             <a:br>
               <a:rPr lang="en-US" dirty="0" smtClean="0"/>
             </a:br>
             <a:r>
               <a:rPr lang="en-US" dirty="0" smtClean="0"/>
-              <a:t>between </a:t>
-            </a:r>
-            <a:r>
-              <a:rPr lang="en-US" dirty="0" smtClean="0"/>
-              <a:t>developers; e.g. SCRUM</a:t>
-            </a:r>
-            <a:endParaRPr lang="en-US" dirty="0" smtClean="0"/>
+              <a:t>between developers; e.g. SCRUM</a:t>
+            </a:r>
           </a:p>
           <a:p>
             <a:pPr marL="0" indent="0">
@@ -3807,7 +4206,7 @@
 </p:sld>
 </file>
 
-<file path=ppt/slides/slide13.xml><?xml version="1.0" encoding="utf-8"?>
+<file path=ppt/slides/slide15.xml><?xml version="1.0" encoding="utf-8"?>
 <p:sld xmlns:a="http://schemas.openxmlformats.org/drawingml/2006/main" xmlns:r="http://schemas.openxmlformats.org/officeDocument/2006/relationships" xmlns:p="http://schemas.openxmlformats.org/presentationml/2006/main">
   <p:cSld>
     <p:spTree>
@@ -3944,7 +4343,7 @@
 </p:sld>
 </file>
 
-<file path=ppt/slides/slide14.xml><?xml version="1.0" encoding="utf-8"?>
+<file path=ppt/slides/slide16.xml><?xml version="1.0" encoding="utf-8"?>
 <p:sld xmlns:a="http://schemas.openxmlformats.org/drawingml/2006/main" xmlns:r="http://schemas.openxmlformats.org/officeDocument/2006/relationships" xmlns:p="http://schemas.openxmlformats.org/presentationml/2006/main">
   <p:cSld>
     <p:spTree>
@@ -4013,7 +4412,15 @@
           <a:p>
             <a:r>
               <a:rPr lang="en-US" dirty="0" smtClean="0"/>
-              <a:t>Team-members should work in their own</a:t>
+              <a:t>Team-members should work </a:t>
+            </a:r>
+            <a:r>
+              <a:rPr lang="en-US" dirty="0" smtClean="0"/>
+              <a:t>on </a:t>
+            </a:r>
+            <a:r>
+              <a:rPr lang="en-US" dirty="0" smtClean="0"/>
+              <a:t>their own</a:t>
             </a:r>
             <a:br>
               <a:rPr lang="en-US" dirty="0" smtClean="0"/>
@@ -4095,7 +4502,7 @@
 </p:sld>
 </file>
 
-<file path=ppt/slides/slide15.xml><?xml version="1.0" encoding="utf-8"?>
+<file path=ppt/slides/slide17.xml><?xml version="1.0" encoding="utf-8"?>
 <p:sld xmlns:a="http://schemas.openxmlformats.org/drawingml/2006/main" xmlns:r="http://schemas.openxmlformats.org/officeDocument/2006/relationships" xmlns:p="http://schemas.openxmlformats.org/presentationml/2006/main">
   <p:cSld>
     <p:spTree>
@@ -6272,6 +6679,37 @@
 </file>
 
 <file path=customXml/item1.xml><?xml version="1.0" encoding="utf-8"?>
+<p:properties xmlns:p="http://schemas.microsoft.com/office/2006/metadata/properties" xmlns:xsi="http://www.w3.org/2001/XMLSchema-instance" xmlns:pc="http://schemas.microsoft.com/office/infopath/2007/PartnerControls">
+  <documentManagement>
+    <Presentation_x0020_Date xmlns="21fd0a9c-7a39-4a32-aeda-14ba4b41f341" xsi:nil="true"/>
+    <Presenter xmlns="21fd0a9c-7a39-4a32-aeda-14ba4b41f341">
+      <UserInfo>
+        <DisplayName/>
+        <AccountId xsi:nil="true"/>
+        <AccountType/>
+      </UserInfo>
+    </Presenter>
+    <Venue xmlns="21fd0a9c-7a39-4a32-aeda-14ba4b41f341" xsi:nil="true"/>
+    <Event xmlns="21fd0a9c-7a39-4a32-aeda-14ba4b41f341" xsi:nil="true"/>
+    <Buddy xmlns="21fd0a9c-7a39-4a32-aeda-14ba4b41f341" xsi:nil="true"/>
+    <lcf76f155ced4ddcb4097134ff3c332f xmlns="21fd0a9c-7a39-4a32-aeda-14ba4b41f341">
+      <Terms xmlns="http://schemas.microsoft.com/office/infopath/2007/PartnerControls"/>
+    </lcf76f155ced4ddcb4097134ff3c332f>
+    <TaxCatchAll xmlns="89ee1cdf-eea7-41b4-be42-a33c70cea0a6" xsi:nil="true"/>
+  </documentManagement>
+</p:properties>
+</file>
+
+<file path=customXml/item2.xml><?xml version="1.0" encoding="utf-8"?>
+<?mso-contentType ?>
+<FormTemplates xmlns="http://schemas.microsoft.com/sharepoint/v3/contenttype/forms">
+  <Display>DocumentLibraryForm</Display>
+  <Edit>DocumentLibraryForm</Edit>
+  <New>DocumentLibraryForm</New>
+</FormTemplates>
+</file>
+
+<file path=customXml/item3.xml><?xml version="1.0" encoding="utf-8"?>
 <ct:contentTypeSchema xmlns:ct="http://schemas.microsoft.com/office/2006/metadata/contentType" xmlns:ma="http://schemas.microsoft.com/office/2006/metadata/properties/metaAttributes" ct:_="" ma:_="" ma:contentTypeName="Document" ma:contentTypeID="0x010100A6BEEBE1D8307047801CBF0D27F3345D" ma:contentTypeVersion="29" ma:contentTypeDescription="Create a new document." ma:contentTypeScope="" ma:versionID="f7330a02be55693d6e5970f8a9f9b260">
   <xsd:schema xmlns:xsd="http://www.w3.org/2001/XMLSchema" xmlns:xs="http://www.w3.org/2001/XMLSchema" xmlns:p="http://schemas.microsoft.com/office/2006/metadata/properties" xmlns:ns2="21fd0a9c-7a39-4a32-aeda-14ba4b41f341" xmlns:ns3="fd7286cc-5839-4f89-bfa8-c9149a72230d" xmlns:ns4="89ee1cdf-eea7-41b4-be42-a33c70cea0a6" targetNamespace="http://schemas.microsoft.com/office/2006/metadata/properties" ma:root="true" ma:fieldsID="7dfe4fa1eeb9b9d72e99396f6bdf8798" ns2:_="" ns3:_="" ns4:_="">
     <xsd:import namespace="21fd0a9c-7a39-4a32-aeda-14ba4b41f341"/>
@@ -6609,45 +7047,41 @@
 </ct:contentTypeSchema>
 </file>
 
-<file path=customXml/item2.xml><?xml version="1.0" encoding="utf-8"?>
-<?mso-contentType ?>
-<FormTemplates xmlns="http://schemas.microsoft.com/sharepoint/v3/contenttype/forms">
-  <Display>DocumentLibraryForm</Display>
-  <Edit>DocumentLibraryForm</Edit>
-  <New>DocumentLibraryForm</New>
-</FormTemplates>
-</file>
-
-<file path=customXml/item3.xml><?xml version="1.0" encoding="utf-8"?>
-<p:properties xmlns:p="http://schemas.microsoft.com/office/2006/metadata/properties" xmlns:xsi="http://www.w3.org/2001/XMLSchema-instance" xmlns:pc="http://schemas.microsoft.com/office/infopath/2007/PartnerControls">
-  <documentManagement>
-    <Presentation_x0020_Date xmlns="21fd0a9c-7a39-4a32-aeda-14ba4b41f341" xsi:nil="true"/>
-    <Presenter xmlns="21fd0a9c-7a39-4a32-aeda-14ba4b41f341">
-      <UserInfo>
-        <DisplayName/>
-        <AccountId xsi:nil="true"/>
-        <AccountType/>
-      </UserInfo>
-    </Presenter>
-    <Venue xmlns="21fd0a9c-7a39-4a32-aeda-14ba4b41f341" xsi:nil="true"/>
-    <Event xmlns="21fd0a9c-7a39-4a32-aeda-14ba4b41f341" xsi:nil="true"/>
-    <Buddy xmlns="21fd0a9c-7a39-4a32-aeda-14ba4b41f341" xsi:nil="true"/>
-    <lcf76f155ced4ddcb4097134ff3c332f xmlns="21fd0a9c-7a39-4a32-aeda-14ba4b41f341">
-      <Terms xmlns="http://schemas.microsoft.com/office/infopath/2007/PartnerControls"/>
-    </lcf76f155ced4ddcb4097134ff3c332f>
-    <TaxCatchAll xmlns="89ee1cdf-eea7-41b4-be42-a33c70cea0a6" xsi:nil="true"/>
-  </documentManagement>
-</p:properties>
-</file>
-
 <file path=customXml/itemProps1.xml><?xml version="1.0" encoding="utf-8"?>
-<ds:datastoreItem xmlns:ds="http://schemas.openxmlformats.org/officeDocument/2006/customXml" ds:itemID="{A463E9BC-FB1B-4B8D-B309-6497EB5659B3}"/>
+<ds:datastoreItem xmlns:ds="http://schemas.openxmlformats.org/officeDocument/2006/customXml" ds:itemID="{3615709B-0C10-4A0A-9CA6-949DDA7A81AE}">
+  <ds:schemaRefs>
+    <ds:schemaRef ds:uri="http://schemas.microsoft.com/office/2006/metadata/properties"/>
+    <ds:schemaRef ds:uri="http://schemas.microsoft.com/office/infopath/2007/PartnerControls"/>
+    <ds:schemaRef ds:uri="21fd0a9c-7a39-4a32-aeda-14ba4b41f341"/>
+    <ds:schemaRef ds:uri="89ee1cdf-eea7-41b4-be42-a33c70cea0a6"/>
+  </ds:schemaRefs>
+</ds:datastoreItem>
 </file>
 
 <file path=customXml/itemProps2.xml><?xml version="1.0" encoding="utf-8"?>
-<ds:datastoreItem xmlns:ds="http://schemas.openxmlformats.org/officeDocument/2006/customXml" ds:itemID="{859A1829-C2A1-4B74-BA00-0957745805BE}"/>
+<ds:datastoreItem xmlns:ds="http://schemas.openxmlformats.org/officeDocument/2006/customXml" ds:itemID="{859A1829-C2A1-4B74-BA00-0957745805BE}">
+  <ds:schemaRefs>
+    <ds:schemaRef ds:uri="http://schemas.microsoft.com/sharepoint/v3/contenttype/forms"/>
+  </ds:schemaRefs>
+</ds:datastoreItem>
 </file>
 
 <file path=customXml/itemProps3.xml><?xml version="1.0" encoding="utf-8"?>
-<ds:datastoreItem xmlns:ds="http://schemas.openxmlformats.org/officeDocument/2006/customXml" ds:itemID="{3615709B-0C10-4A0A-9CA6-949DDA7A81AE}"/>
+<ds:datastoreItem xmlns:ds="http://schemas.openxmlformats.org/officeDocument/2006/customXml" ds:itemID="{A463E9BC-FB1B-4B8D-B309-6497EB5659B3}">
+  <ds:schemaRefs>
+    <ds:schemaRef ds:uri="http://schemas.microsoft.com/office/2006/metadata/contentType"/>
+    <ds:schemaRef ds:uri="http://schemas.microsoft.com/office/2006/metadata/properties/metaAttributes"/>
+    <ds:schemaRef ds:uri="http://www.w3.org/2001/XMLSchema"/>
+    <ds:schemaRef ds:uri="http://schemas.microsoft.com/office/2006/metadata/properties"/>
+    <ds:schemaRef ds:uri="21fd0a9c-7a39-4a32-aeda-14ba4b41f341"/>
+    <ds:schemaRef ds:uri="fd7286cc-5839-4f89-bfa8-c9149a72230d"/>
+    <ds:schemaRef ds:uri="89ee1cdf-eea7-41b4-be42-a33c70cea0a6"/>
+    <ds:schemaRef ds:uri="http://schemas.microsoft.com/office/2006/documentManagement/types"/>
+    <ds:schemaRef ds:uri="http://schemas.microsoft.com/office/infopath/2007/PartnerControls"/>
+    <ds:schemaRef ds:uri="http://schemas.openxmlformats.org/package/2006/metadata/core-properties"/>
+    <ds:schemaRef ds:uri="http://purl.org/dc/elements/1.1/"/>
+    <ds:schemaRef ds:uri="http://purl.org/dc/terms/"/>
+    <ds:schemaRef ds:uri="http://schemas.microsoft.com/internal/obd"/>
+  </ds:schemaRefs>
+</ds:datastoreItem>
 </file>
</xml_diff>